<commit_message>
Added calling pageReinicialize() to delete
</commit_message>
<xml_diff>
--- a/BP/Obhajoba BP/2021/ITT prezentace.pptx
+++ b/BP/Obhajoba BP/2021/ITT prezentace.pptx
@@ -207,7 +207,7 @@
           <a:p>
             <a:fld id="{1ECA4D9A-DB86-42F4-B0CB-CCEB528B2F0F}" type="datetimeFigureOut">
               <a:rPr lang="cs-CZ" smtClean="0"/>
-              <a:t>31.01.2021</a:t>
+              <a:t>03.02.2021</a:t>
             </a:fld>
             <a:endParaRPr lang="cs-CZ"/>
           </a:p>
@@ -650,7 +650,7 @@
           <a:p>
             <a:fld id="{58A618E6-A94F-488D-8086-960CFCC481AA}" type="datetime1">
               <a:rPr lang="cs-CZ" smtClean="0"/>
-              <a:t>31.01.2021</a:t>
+              <a:t>03.02.2021</a:t>
             </a:fld>
             <a:endParaRPr lang="cs-CZ"/>
           </a:p>
@@ -820,7 +820,7 @@
           <a:p>
             <a:fld id="{E9B93010-55F6-4B41-A769-A887B4B0E1D7}" type="datetime1">
               <a:rPr lang="cs-CZ" smtClean="0"/>
-              <a:t>31.01.2021</a:t>
+              <a:t>03.02.2021</a:t>
             </a:fld>
             <a:endParaRPr lang="cs-CZ"/>
           </a:p>
@@ -1043,7 +1043,7 @@
           <a:p>
             <a:fld id="{73BCB365-77BF-42DD-92EA-B9839185B64C}" type="datetime1">
               <a:rPr lang="cs-CZ" smtClean="0"/>
-              <a:t>31.01.2021</a:t>
+              <a:t>03.02.2021</a:t>
             </a:fld>
             <a:endParaRPr lang="cs-CZ"/>
           </a:p>
@@ -1261,7 +1261,7 @@
           <a:p>
             <a:fld id="{58A618E6-A94F-488D-8086-960CFCC481AA}" type="datetime1">
               <a:rPr lang="cs-CZ" smtClean="0"/>
-              <a:t>31.01.2021</a:t>
+              <a:t>03.02.2021</a:t>
             </a:fld>
             <a:endParaRPr lang="cs-CZ"/>
           </a:p>
@@ -1459,7 +1459,7 @@
           <a:p>
             <a:fld id="{51AEF1FE-3B6E-40D7-8E3F-15D57B7B5D50}" type="datetime1">
               <a:rPr lang="cs-CZ" smtClean="0"/>
-              <a:t>31.01.2021</a:t>
+              <a:t>03.02.2021</a:t>
             </a:fld>
             <a:endParaRPr lang="cs-CZ"/>
           </a:p>
@@ -1735,7 +1735,7 @@
           <a:p>
             <a:fld id="{A6DF30C0-002B-4FAD-BABD-6E65770E5245}" type="datetime1">
               <a:rPr lang="cs-CZ" smtClean="0"/>
-              <a:t>31.01.2021</a:t>
+              <a:t>03.02.2021</a:t>
             </a:fld>
             <a:endParaRPr lang="cs-CZ"/>
           </a:p>
@@ -2000,7 +2000,7 @@
           <a:p>
             <a:fld id="{1D789B9F-D231-47F7-84E2-BCCA23A7EF47}" type="datetime1">
               <a:rPr lang="cs-CZ" smtClean="0"/>
-              <a:t>31.01.2021</a:t>
+              <a:t>03.02.2021</a:t>
             </a:fld>
             <a:endParaRPr lang="cs-CZ"/>
           </a:p>
@@ -2412,7 +2412,7 @@
           <a:p>
             <a:fld id="{421C5239-6278-4606-9247-342C94C694FD}" type="datetime1">
               <a:rPr lang="cs-CZ" smtClean="0"/>
-              <a:t>31.01.2021</a:t>
+              <a:t>03.02.2021</a:t>
             </a:fld>
             <a:endParaRPr lang="cs-CZ"/>
           </a:p>
@@ -2553,7 +2553,7 @@
           <a:p>
             <a:fld id="{FE3F8548-68B4-4F82-B1B0-2169DF091756}" type="datetime1">
               <a:rPr lang="cs-CZ" smtClean="0"/>
-              <a:t>31.01.2021</a:t>
+              <a:t>03.02.2021</a:t>
             </a:fld>
             <a:endParaRPr lang="cs-CZ"/>
           </a:p>
@@ -2666,7 +2666,7 @@
           <a:p>
             <a:fld id="{FF852F47-8347-4580-94B3-871D0842554A}" type="datetime1">
               <a:rPr lang="cs-CZ" smtClean="0"/>
-              <a:t>31.01.2021</a:t>
+              <a:t>03.02.2021</a:t>
             </a:fld>
             <a:endParaRPr lang="cs-CZ"/>
           </a:p>
@@ -2977,7 +2977,7 @@
           <a:p>
             <a:fld id="{E48D1949-BE03-403A-97DF-0F3EA7E81ED7}" type="datetime1">
               <a:rPr lang="cs-CZ" smtClean="0"/>
-              <a:t>31.01.2021</a:t>
+              <a:t>03.02.2021</a:t>
             </a:fld>
             <a:endParaRPr lang="cs-CZ"/>
           </a:p>
@@ -3159,7 +3159,7 @@
           <a:p>
             <a:fld id="{51AEF1FE-3B6E-40D7-8E3F-15D57B7B5D50}" type="datetime1">
               <a:rPr lang="cs-CZ" smtClean="0"/>
-              <a:t>31.01.2021</a:t>
+              <a:t>03.02.2021</a:t>
             </a:fld>
             <a:endParaRPr lang="cs-CZ"/>
           </a:p>
@@ -3436,7 +3436,7 @@
           <a:p>
             <a:fld id="{639E4EC3-9043-4A5E-8232-09D64A473477}" type="datetime1">
               <a:rPr lang="cs-CZ" smtClean="0"/>
-              <a:t>31.01.2021</a:t>
+              <a:t>03.02.2021</a:t>
             </a:fld>
             <a:endParaRPr lang="cs-CZ"/>
           </a:p>
@@ -3634,7 +3634,7 @@
           <a:p>
             <a:fld id="{E9B93010-55F6-4B41-A769-A887B4B0E1D7}" type="datetime1">
               <a:rPr lang="cs-CZ" smtClean="0"/>
-              <a:t>31.01.2021</a:t>
+              <a:t>03.02.2021</a:t>
             </a:fld>
             <a:endParaRPr lang="cs-CZ"/>
           </a:p>
@@ -3842,7 +3842,7 @@
           <a:p>
             <a:fld id="{73BCB365-77BF-42DD-92EA-B9839185B64C}" type="datetime1">
               <a:rPr lang="cs-CZ" smtClean="0"/>
-              <a:t>31.01.2021</a:t>
+              <a:t>03.02.2021</a:t>
             </a:fld>
             <a:endParaRPr lang="cs-CZ"/>
           </a:p>
@@ -4155,7 +4155,7 @@
           <a:p>
             <a:fld id="{A6DF30C0-002B-4FAD-BABD-6E65770E5245}" type="datetime1">
               <a:rPr lang="cs-CZ" smtClean="0"/>
-              <a:t>31.01.2021</a:t>
+              <a:t>03.02.2021</a:t>
             </a:fld>
             <a:endParaRPr lang="cs-CZ"/>
           </a:p>
@@ -4459,7 +4459,7 @@
           <a:p>
             <a:fld id="{1D789B9F-D231-47F7-84E2-BCCA23A7EF47}" type="datetime1">
               <a:rPr lang="cs-CZ" smtClean="0"/>
-              <a:t>31.01.2021</a:t>
+              <a:t>03.02.2021</a:t>
             </a:fld>
             <a:endParaRPr lang="cs-CZ"/>
           </a:p>
@@ -4881,7 +4881,7 @@
           <a:p>
             <a:fld id="{421C5239-6278-4606-9247-342C94C694FD}" type="datetime1">
               <a:rPr lang="cs-CZ" smtClean="0"/>
-              <a:t>31.01.2021</a:t>
+              <a:t>03.02.2021</a:t>
             </a:fld>
             <a:endParaRPr lang="cs-CZ"/>
           </a:p>
@@ -4999,7 +4999,7 @@
           <a:p>
             <a:fld id="{FE3F8548-68B4-4F82-B1B0-2169DF091756}" type="datetime1">
               <a:rPr lang="cs-CZ" smtClean="0"/>
-              <a:t>31.01.2021</a:t>
+              <a:t>03.02.2021</a:t>
             </a:fld>
             <a:endParaRPr lang="cs-CZ"/>
           </a:p>
@@ -5094,7 +5094,7 @@
           <a:p>
             <a:fld id="{FF852F47-8347-4580-94B3-871D0842554A}" type="datetime1">
               <a:rPr lang="cs-CZ" smtClean="0"/>
-              <a:t>31.01.2021</a:t>
+              <a:t>03.02.2021</a:t>
             </a:fld>
             <a:endParaRPr lang="cs-CZ"/>
           </a:p>
@@ -5367,7 +5367,7 @@
           <a:p>
             <a:fld id="{E48D1949-BE03-403A-97DF-0F3EA7E81ED7}" type="datetime1">
               <a:rPr lang="cs-CZ" smtClean="0"/>
-              <a:t>31.01.2021</a:t>
+              <a:t>03.02.2021</a:t>
             </a:fld>
             <a:endParaRPr lang="cs-CZ"/>
           </a:p>
@@ -5632,7 +5632,7 @@
           <a:p>
             <a:fld id="{639E4EC3-9043-4A5E-8232-09D64A473477}" type="datetime1">
               <a:rPr lang="cs-CZ" smtClean="0"/>
-              <a:t>31.01.2021</a:t>
+              <a:t>03.02.2021</a:t>
             </a:fld>
             <a:endParaRPr lang="cs-CZ"/>
           </a:p>
@@ -5881,7 +5881,7 @@
           <a:p>
             <a:fld id="{51AEF1FE-3B6E-40D7-8E3F-15D57B7B5D50}" type="datetime1">
               <a:rPr lang="cs-CZ" smtClean="0"/>
-              <a:t>31.01.2021</a:t>
+              <a:t>03.02.2021</a:t>
             </a:fld>
             <a:endParaRPr lang="cs-CZ"/>
           </a:p>
@@ -6488,7 +6488,7 @@
           <a:p>
             <a:fld id="{51AEF1FE-3B6E-40D7-8E3F-15D57B7B5D50}" type="datetime1">
               <a:rPr lang="cs-CZ" smtClean="0"/>
-              <a:t>31.01.2021</a:t>
+              <a:t>03.02.2021</a:t>
             </a:fld>
             <a:endParaRPr lang="cs-CZ"/>
           </a:p>
@@ -7310,15 +7310,7 @@
           </a:lstStyle>
           <a:p>
             <a:r>
-              <a:rPr lang="cs-CZ" sz="1600" dirty="0">
-                <a:effectLst>
-                  <a:outerShdw blurRad="38100" dist="38100" dir="2700000" algn="tl">
-                    <a:srgbClr val="000000">
-                      <a:alpha val="43137"/>
-                    </a:srgbClr>
-                  </a:outerShdw>
-                </a:effectLst>
-              </a:rPr>
+              <a:rPr lang="cs-CZ" sz="1600" dirty="0"/>
               <a:t>4. 2. 2021</a:t>
             </a:r>
           </a:p>
@@ -7759,68 +7751,28 @@
           <a:p>
             <a:pPr algn="r"/>
             <a:r>
-              <a:rPr lang="cs-CZ" sz="2000" dirty="0">
-                <a:effectLst>
-                  <a:outerShdw blurRad="38100" dist="38100" dir="2700000" algn="tl">
-                    <a:srgbClr val="000000">
-                      <a:alpha val="43137"/>
-                    </a:srgbClr>
-                  </a:outerShdw>
-                </a:effectLst>
-              </a:rPr>
+              <a:rPr lang="cs-CZ" sz="3200" dirty="0"/>
               <a:t>Petr Marek</a:t>
             </a:r>
           </a:p>
           <a:p>
             <a:pPr algn="r"/>
             <a:r>
-              <a:rPr lang="cs-CZ" sz="2000" dirty="0">
-                <a:effectLst>
-                  <a:outerShdw blurRad="38100" dist="38100" dir="2700000" algn="tl">
-                    <a:srgbClr val="000000">
-                      <a:alpha val="43137"/>
-                    </a:srgbClr>
-                  </a:outerShdw>
-                </a:effectLst>
-              </a:rPr>
+              <a:rPr lang="cs-CZ" sz="2000" dirty="0"/>
               <a:t>xmarek69@fit.vutbr.cz</a:t>
             </a:r>
           </a:p>
           <a:p>
             <a:pPr algn="r"/>
             <a:r>
-              <a:rPr lang="cs-CZ" sz="2000" dirty="0">
-                <a:effectLst>
-                  <a:outerShdw blurRad="38100" dist="38100" dir="2700000" algn="tl">
-                    <a:srgbClr val="000000">
-                      <a:alpha val="43137"/>
-                    </a:srgbClr>
-                  </a:outerShdw>
-                </a:effectLst>
-              </a:rPr>
+              <a:rPr lang="cs-CZ" sz="2000" dirty="0"/>
               <a:t>Vedoucí práce: Prof. Dr. Ing. Pavel </a:t>
             </a:r>
             <a:r>
-              <a:rPr lang="cs-CZ" sz="2000" dirty="0" err="1">
-                <a:effectLst>
-                  <a:outerShdw blurRad="38100" dist="38100" dir="2700000" algn="tl">
-                    <a:srgbClr val="000000">
-                      <a:alpha val="43137"/>
-                    </a:srgbClr>
-                  </a:outerShdw>
-                </a:effectLst>
-              </a:rPr>
+              <a:rPr lang="cs-CZ" sz="2000" dirty="0" err="1"/>
               <a:t>Zemčík</a:t>
             </a:r>
-            <a:endParaRPr lang="cs-CZ" sz="2000" dirty="0">
-              <a:effectLst>
-                <a:outerShdw blurRad="38100" dist="38100" dir="2700000" algn="tl">
-                  <a:srgbClr val="000000">
-                    <a:alpha val="43137"/>
-                  </a:srgbClr>
-                </a:outerShdw>
-              </a:effectLst>
-            </a:endParaRPr>
+            <a:endParaRPr lang="cs-CZ" sz="2000" dirty="0"/>
           </a:p>
         </p:txBody>
       </p:sp>

</xml_diff>